<commit_message>
Travis build 40 for es2016-proxies (1b234ef0)
Original commit: 1b234ef060149d09772a9ea7daf55603f7cb7abc
Publication location: https://jscert.github.io/jsexplain/branch/es2016-proxies
Travis job: https://travis-ci.org/jscert/jsexplain/jobs/203484939
</commit_message>
<xml_diff>
--- a/branch/es2016-proxies/doc/screenshots/001_Breakdown.pptx
+++ b/branch/es2016-proxies/doc/screenshots/001_Breakdown.pptx
@@ -104,6 +104,11 @@
       </a:defRPr>
     </a:lvl9pPr>
   </p:defaultTextStyle>
+  <p:extLst>
+    <p:ext uri="{EFAFB233-063F-42B5-8137-9DF3F51BA10A}">
+      <p15:sldGuideLst xmlns:p15="http://schemas.microsoft.com/office/powerpoint/2012/main"/>
+    </p:ext>
+  </p:extLst>
 </p:presentation>
 </file>
 
@@ -238,7 +243,7 @@
           <a:p>
             <a:fld id="{AC2DE82D-EEBC-6648-912C-8EAED29AAE78}" type="datetimeFigureOut">
               <a:rPr lang="en-US" smtClean="0"/>
-              <a:t>11/21/16</a:t>
+              <a:t>11/23/16</a:t>
             </a:fld>
             <a:endParaRPr lang="en-US"/>
           </a:p>
@@ -408,7 +413,7 @@
           <a:p>
             <a:fld id="{AC2DE82D-EEBC-6648-912C-8EAED29AAE78}" type="datetimeFigureOut">
               <a:rPr lang="en-US" smtClean="0"/>
-              <a:t>11/21/16</a:t>
+              <a:t>11/23/16</a:t>
             </a:fld>
             <a:endParaRPr lang="en-US"/>
           </a:p>
@@ -588,7 +593,7 @@
           <a:p>
             <a:fld id="{AC2DE82D-EEBC-6648-912C-8EAED29AAE78}" type="datetimeFigureOut">
               <a:rPr lang="en-US" smtClean="0"/>
-              <a:t>11/21/16</a:t>
+              <a:t>11/23/16</a:t>
             </a:fld>
             <a:endParaRPr lang="en-US"/>
           </a:p>
@@ -758,7 +763,7 @@
           <a:p>
             <a:fld id="{AC2DE82D-EEBC-6648-912C-8EAED29AAE78}" type="datetimeFigureOut">
               <a:rPr lang="en-US" smtClean="0"/>
-              <a:t>11/21/16</a:t>
+              <a:t>11/23/16</a:t>
             </a:fld>
             <a:endParaRPr lang="en-US"/>
           </a:p>
@@ -1004,7 +1009,7 @@
           <a:p>
             <a:fld id="{AC2DE82D-EEBC-6648-912C-8EAED29AAE78}" type="datetimeFigureOut">
               <a:rPr lang="en-US" smtClean="0"/>
-              <a:t>11/21/16</a:t>
+              <a:t>11/23/16</a:t>
             </a:fld>
             <a:endParaRPr lang="en-US"/>
           </a:p>
@@ -1236,7 +1241,7 @@
           <a:p>
             <a:fld id="{AC2DE82D-EEBC-6648-912C-8EAED29AAE78}" type="datetimeFigureOut">
               <a:rPr lang="en-US" smtClean="0"/>
-              <a:t>11/21/16</a:t>
+              <a:t>11/23/16</a:t>
             </a:fld>
             <a:endParaRPr lang="en-US"/>
           </a:p>
@@ -1603,7 +1608,7 @@
           <a:p>
             <a:fld id="{AC2DE82D-EEBC-6648-912C-8EAED29AAE78}" type="datetimeFigureOut">
               <a:rPr lang="en-US" smtClean="0"/>
-              <a:t>11/21/16</a:t>
+              <a:t>11/23/16</a:t>
             </a:fld>
             <a:endParaRPr lang="en-US"/>
           </a:p>
@@ -1721,7 +1726,7 @@
           <a:p>
             <a:fld id="{AC2DE82D-EEBC-6648-912C-8EAED29AAE78}" type="datetimeFigureOut">
               <a:rPr lang="en-US" smtClean="0"/>
-              <a:t>11/21/16</a:t>
+              <a:t>11/23/16</a:t>
             </a:fld>
             <a:endParaRPr lang="en-US"/>
           </a:p>
@@ -1816,7 +1821,7 @@
           <a:p>
             <a:fld id="{AC2DE82D-EEBC-6648-912C-8EAED29AAE78}" type="datetimeFigureOut">
               <a:rPr lang="en-US" smtClean="0"/>
-              <a:t>11/21/16</a:t>
+              <a:t>11/23/16</a:t>
             </a:fld>
             <a:endParaRPr lang="en-US"/>
           </a:p>
@@ -2093,7 +2098,7 @@
           <a:p>
             <a:fld id="{AC2DE82D-EEBC-6648-912C-8EAED29AAE78}" type="datetimeFigureOut">
               <a:rPr lang="en-US" smtClean="0"/>
-              <a:t>11/21/16</a:t>
+              <a:t>11/23/16</a:t>
             </a:fld>
             <a:endParaRPr lang="en-US"/>
           </a:p>
@@ -2346,7 +2351,7 @@
           <a:p>
             <a:fld id="{AC2DE82D-EEBC-6648-912C-8EAED29AAE78}" type="datetimeFigureOut">
               <a:rPr lang="en-US" smtClean="0"/>
-              <a:t>11/21/16</a:t>
+              <a:t>11/23/16</a:t>
             </a:fld>
             <a:endParaRPr lang="en-US"/>
           </a:p>
@@ -2559,7 +2564,7 @@
           <a:p>
             <a:fld id="{AC2DE82D-EEBC-6648-912C-8EAED29AAE78}" type="datetimeFigureOut">
               <a:rPr lang="en-US" smtClean="0"/>
-              <a:t>11/21/16</a:t>
+              <a:t>11/23/16</a:t>
             </a:fld>
             <a:endParaRPr lang="en-US"/>
           </a:p>
@@ -3601,7 +3606,15 @@
                   <a:schemeClr val="accent1"/>
                 </a:solidFill>
               </a:rPr>
-              <a:t>Program selection</a:t>
+              <a:t>Program </a:t>
+            </a:r>
+            <a:r>
+              <a:rPr lang="en-US" sz="1400" b="1" dirty="0" smtClean="0">
+                <a:solidFill>
+                  <a:schemeClr val="accent1"/>
+                </a:solidFill>
+              </a:rPr>
+              <a:t>Selection</a:t>
             </a:r>
             <a:endParaRPr lang="en-US" sz="1400" b="1" dirty="0">
               <a:solidFill>
@@ -3675,7 +3688,15 @@
                   <a:schemeClr val="accent1"/>
                 </a:solidFill>
               </a:rPr>
-              <a:t>Current program</a:t>
+              <a:t>Current </a:t>
+            </a:r>
+            <a:r>
+              <a:rPr lang="en-US" sz="1400" b="1" dirty="0" smtClean="0">
+                <a:solidFill>
+                  <a:schemeClr val="accent1"/>
+                </a:solidFill>
+              </a:rPr>
+              <a:t>Program</a:t>
             </a:r>
             <a:endParaRPr lang="en-US" sz="1400" b="1" dirty="0">
               <a:solidFill>
@@ -3709,12 +3730,12 @@
           <a:p>
             <a:pPr algn="ctr"/>
             <a:r>
-              <a:rPr lang="en-US" sz="1400" b="1" smtClean="0">
+              <a:rPr lang="en-US" sz="1400" b="1" dirty="0" smtClean="0">
                 <a:solidFill>
                   <a:schemeClr val="accent1"/>
                 </a:solidFill>
               </a:rPr>
-              <a:t>State of the program heap</a:t>
+              <a:t>Program Heap State</a:t>
             </a:r>
             <a:endParaRPr lang="en-US" sz="1400" b="1" dirty="0">
               <a:solidFill>
@@ -3783,12 +3804,20 @@
           <a:p>
             <a:pPr algn="ctr"/>
             <a:r>
-              <a:rPr lang="en-US" sz="1400" b="1" smtClean="0">
+              <a:rPr lang="en-US" sz="1400" b="1" dirty="0" smtClean="0">
                 <a:solidFill>
                   <a:schemeClr val="accent1"/>
                 </a:solidFill>
               </a:rPr>
-              <a:t>Navigation panel</a:t>
+              <a:t>Navigation </a:t>
+            </a:r>
+            <a:r>
+              <a:rPr lang="en-US" sz="1400" b="1" dirty="0" smtClean="0">
+                <a:solidFill>
+                  <a:schemeClr val="accent1"/>
+                </a:solidFill>
+              </a:rPr>
+              <a:t>Panel</a:t>
             </a:r>
             <a:endParaRPr lang="en-US" sz="1400" b="1" dirty="0">
               <a:solidFill>
@@ -3965,7 +3994,7 @@
                   <a:schemeClr val="accent1"/>
                 </a:solidFill>
               </a:rPr>
-              <a:t>State of the interpreter</a:t>
+              <a:t>Interpreter State</a:t>
             </a:r>
             <a:endParaRPr lang="en-US" sz="1400" b="1" dirty="0">
               <a:solidFill>

</xml_diff>